<commit_message>
procedura di gestione del remoto
</commit_message>
<xml_diff>
--- a/git Alex giu2020.pptx
+++ b/git Alex giu2020.pptx
@@ -120,6 +120,11 @@
       </a:defRPr>
     </a:lvl9pPr>
   </p:defaultTextStyle>
+  <p:extLst>
+    <p:ext uri="{EFAFB233-063F-42B5-8137-9DF3F51BA10A}">
+      <p15:sldGuideLst xmlns:p15="http://schemas.microsoft.com/office/powerpoint/2012/main"/>
+    </p:ext>
+  </p:extLst>
 </p:presentation>
 </file>
 
@@ -4648,7 +4653,7 @@
         <p:spPr>
           <a:xfrm>
             <a:off x="288000" y="288000"/>
-            <a:ext cx="8219880" cy="2583869"/>
+            <a:ext cx="8219880" cy="2860868"/>
           </a:xfrm>
           <a:prstGeom prst="rect">
             <a:avLst/>
@@ -4728,80 +4733,91 @@
               <a:rPr lang="it-IT" sz="1800" b="0" strike="noStrike" spc="-1" dirty="0">
                 <a:latin typeface="Arial"/>
               </a:rPr>
-              <a:t>In locale, nella </a:t>
-            </a:r>
-            <a:r>
-              <a:rPr lang="it-IT" sz="1800" b="0" strike="noStrike" spc="-1">
-                <a:latin typeface="Arial"/>
-              </a:rPr>
-              <a:t>cartella precedente faccio </a:t>
+              <a:t>In locale, nella cartella precedente faccio :</a:t>
+            </a:r>
+            <a:r>
+              <a:rPr lang="it-IT" sz="1800" b="0" strike="noStrike" spc="-1" dirty="0" err="1">
+                <a:latin typeface="Arial"/>
+              </a:rPr>
+              <a:t>git</a:t>
             </a:r>
             <a:r>
               <a:rPr lang="it-IT" sz="1800" b="0" strike="noStrike" spc="-1" dirty="0">
                 <a:latin typeface="Arial"/>
               </a:rPr>
-              <a:t>:</a:t>
+              <a:t> clone &lt;</a:t>
             </a:r>
             <a:r>
               <a:rPr lang="it-IT" sz="1800" b="0" strike="noStrike" spc="-1" dirty="0" err="1">
                 <a:latin typeface="Arial"/>
               </a:rPr>
+              <a:t>url</a:t>
+            </a:r>
+            <a:r>
+              <a:rPr lang="it-IT" sz="1800" b="0" strike="noStrike" spc="-1" dirty="0">
+                <a:latin typeface="Arial"/>
+              </a:rPr>
+              <a:t>&gt;</a:t>
+            </a:r>
+          </a:p>
+          <a:p>
+            <a:r>
+              <a:rPr lang="it-IT" sz="1800" b="0" strike="noStrike" spc="-1" dirty="0">
+                <a:latin typeface="Arial"/>
+              </a:rPr>
+              <a:t>Il server remoto mi chiede l’autenticazione e poi scarica</a:t>
+            </a:r>
+          </a:p>
+          <a:p>
+            <a:r>
+              <a:rPr lang="it-IT" sz="1800" b="0" strike="noStrike" spc="-1" dirty="0">
+                <a:latin typeface="Arial"/>
+              </a:rPr>
+              <a:t>Nella cartella in cui ho fatto :</a:t>
+            </a:r>
+            <a:r>
+              <a:rPr lang="it-IT" sz="1800" b="0" strike="noStrike" spc="-1" dirty="0" err="1">
+                <a:latin typeface="Arial"/>
+              </a:rPr>
               <a:t>git</a:t>
             </a:r>
             <a:r>
               <a:rPr lang="it-IT" sz="1800" b="0" strike="noStrike" spc="-1" dirty="0">
                 <a:latin typeface="Arial"/>
               </a:rPr>
-              <a:t> clone &lt;</a:t>
-            </a:r>
-            <a:r>
-              <a:rPr lang="it-IT" sz="1800" b="0" strike="noStrike" spc="-1" dirty="0" err="1">
-                <a:latin typeface="Arial"/>
-              </a:rPr>
-              <a:t>url</a:t>
-            </a:r>
+              <a:t> clone viene creata la cartella remota , </a:t>
+            </a:r>
+          </a:p>
+          <a:p>
             <a:r>
               <a:rPr lang="it-IT" sz="1800" b="0" strike="noStrike" spc="-1" dirty="0">
                 <a:latin typeface="Arial"/>
               </a:rPr>
-              <a:t>&gt;</a:t>
-            </a:r>
-          </a:p>
-          <a:p>
-            <a:r>
-              <a:rPr lang="it-IT" sz="1800" b="0" strike="noStrike" spc="-1" dirty="0">
-                <a:latin typeface="Arial"/>
-              </a:rPr>
-              <a:t>Il server remoto mi chiede l’autenticazione e poi scarica</a:t>
-            </a:r>
-          </a:p>
-          <a:p>
-            <a:r>
-              <a:rPr lang="it-IT" sz="1800" b="0" strike="noStrike" spc="-1" dirty="0">
-                <a:latin typeface="Arial"/>
-              </a:rPr>
-              <a:t>Nella cartella in cui ho fatto :</a:t>
-            </a:r>
-            <a:r>
-              <a:rPr lang="it-IT" sz="1800" b="0" strike="noStrike" spc="-1" dirty="0" err="1">
+              <a:t>quindi posso fare altri clone nella stessa cartella.</a:t>
+            </a:r>
+          </a:p>
+          <a:p>
+            <a:r>
+              <a:rPr lang="it-IT" spc="-1" dirty="0">
+                <a:latin typeface="Arial"/>
+              </a:rPr>
+              <a:t>L’aggiornamento si fa con :</a:t>
+            </a:r>
+            <a:r>
+              <a:rPr lang="it-IT" spc="-1" dirty="0" err="1">
                 <a:latin typeface="Arial"/>
               </a:rPr>
               <a:t>git</a:t>
             </a:r>
             <a:r>
-              <a:rPr lang="it-IT" sz="1800" b="0" strike="noStrike" spc="-1" dirty="0">
-                <a:latin typeface="Arial"/>
-              </a:rPr>
-              <a:t> clone viene creata la cartella remota , </a:t>
-            </a:r>
-          </a:p>
-          <a:p>
-            <a:r>
-              <a:rPr lang="it-IT" sz="1800" b="0" strike="noStrike" spc="-1" dirty="0">
-                <a:latin typeface="Arial"/>
-              </a:rPr>
-              <a:t>quindi posso fare altri clone nella stessa cartella</a:t>
-            </a:r>
+              <a:rPr lang="it-IT" spc="-1" dirty="0">
+                <a:latin typeface="Arial"/>
+              </a:rPr>
+              <a:t> pull   (e non update)</a:t>
+            </a:r>
+            <a:endParaRPr lang="it-IT" sz="1800" b="0" strike="noStrike" spc="-1" dirty="0">
+              <a:latin typeface="Arial"/>
+            </a:endParaRPr>
           </a:p>
         </p:txBody>
       </p:sp>
@@ -4817,7 +4833,7 @@
         </p:blipFill>
         <p:spPr>
           <a:xfrm>
-            <a:off x="360000" y="2736000"/>
+            <a:off x="288000" y="3558960"/>
             <a:ext cx="4718520" cy="2880000"/>
           </a:xfrm>
           <a:prstGeom prst="rect">
@@ -4840,7 +4856,7 @@
         </p:blipFill>
         <p:spPr>
           <a:xfrm>
-            <a:off x="5400000" y="2376000"/>
+            <a:off x="5438760" y="2588221"/>
             <a:ext cx="6753240" cy="4219560"/>
           </a:xfrm>
           <a:prstGeom prst="rect">

</xml_diff>